<commit_message>
Added infrastructure as code slides
</commit_message>
<xml_diff>
--- a/02-Container-and-Provisioning/01-ContainerProvisioning.pptx
+++ b/02-Container-and-Provisioning/01-ContainerProvisioning.pptx
@@ -252,7 +252,7 @@
           <a:p>
             <a:fld id="{852105B6-D441-4EC0-9FA7-CF26CD0B8EA0}" type="datetimeFigureOut">
               <a:rPr lang="en-US" smtClean="0"/>
-              <a:t>10/15/2017</a:t>
+              <a:t>10/31/2017</a:t>
             </a:fld>
             <a:endParaRPr lang="en-US"/>
           </a:p>
@@ -2196,6 +2196,17 @@
               </a:spcBef>
             </a:pPr>
             <a:r>
+              <a:rPr lang="de-DE" sz="923" b="0">
+                <a:solidFill>
+                  <a:srgbClr val="FF9A00"/>
+                </a:solidFill>
+                <a:latin typeface="Helvetica" charset="0"/>
+                <a:ea typeface="Helvetica" charset="0"/>
+                <a:cs typeface="Helvetica" charset="0"/>
+              </a:rPr>
+              <a:t>Tobias </a:t>
+            </a:r>
+            <a:r>
               <a:rPr lang="de-DE" sz="923" b="0" dirty="0">
                 <a:solidFill>
                   <a:srgbClr val="FF9A00"/>
@@ -2204,7 +2215,7 @@
                 <a:ea typeface="Helvetica" charset="0"/>
                 <a:cs typeface="Helvetica" charset="0"/>
               </a:rPr>
-              <a:t>Tobis Jonas – Peter Kurfer – </a:t>
+              <a:t>Jonas – Peter Kurfer – </a:t>
             </a:r>
             <a:r>
               <a:rPr lang="de-DE" sz="923" b="0" dirty="0" err="1">
@@ -2871,9 +2882,10 @@
           <a:lstStyle/>
           <a:p>
             <a:r>
-              <a:rPr lang="en-US" dirty="0"/>
-              <a:t>Container and provisioning</a:t>
-            </a:r>
+              <a:rPr lang="en-US"/>
+              <a:t>Microservices</a:t>
+            </a:r>
+            <a:endParaRPr lang="en-US" dirty="0"/>
           </a:p>
         </p:txBody>
       </p:sp>
@@ -2893,45 +2905,10 @@
           <a:lstStyle/>
           <a:p>
             <a:r>
-              <a:rPr lang="de-DE" dirty="0" err="1"/>
-              <a:t>Why</a:t>
-            </a:r>
-            <a:r>
-              <a:rPr lang="de-DE" dirty="0"/>
-              <a:t> </a:t>
-            </a:r>
-            <a:r>
-              <a:rPr lang="de-DE" dirty="0" err="1"/>
-              <a:t>is</a:t>
-            </a:r>
-            <a:r>
-              <a:rPr lang="de-DE" dirty="0"/>
-              <a:t> </a:t>
-            </a:r>
-            <a:r>
-              <a:rPr lang="de-DE" dirty="0" err="1"/>
-              <a:t>everyone</a:t>
-            </a:r>
-            <a:r>
-              <a:rPr lang="de-DE" dirty="0"/>
-              <a:t> </a:t>
-            </a:r>
-            <a:r>
-              <a:rPr lang="de-DE" dirty="0" err="1"/>
-              <a:t>talking</a:t>
-            </a:r>
-            <a:r>
-              <a:rPr lang="de-DE" dirty="0"/>
-              <a:t> </a:t>
-            </a:r>
-            <a:r>
-              <a:rPr lang="de-DE" dirty="0" err="1"/>
-              <a:t>about</a:t>
-            </a:r>
-            <a:r>
-              <a:rPr lang="de-DE" dirty="0"/>
-              <a:t> Docker?</a:t>
-            </a:r>
+              <a:rPr lang="en-US" dirty="0"/>
+              <a:t>Container and provisioning</a:t>
+            </a:r>
+            <a:endParaRPr lang="de-DE" dirty="0"/>
           </a:p>
         </p:txBody>
       </p:sp>
@@ -4123,13 +4100,8 @@
                     <a:p>
                       <a:r>
                         <a:rPr lang="en-US" dirty="0"/>
-                        <a:t>Login to a private </a:t>
+                        <a:t>Login to a private Docker registry</a:t>
                       </a:r>
-                      <a:r>
-                        <a:rPr lang="en-US"/>
-                        <a:t>Docker registry</a:t>
-                      </a:r>
-                      <a:endParaRPr lang="en-US" dirty="0"/>
                     </a:p>
                   </a:txBody>
                   <a:tcPr/>

</xml_diff>